<commit_message>
update notebook with working demo of hallway env
</commit_message>
<xml_diff>
--- a/docs/source/img/hallway.pptx
+++ b/docs/source/img/hallway.pptx
@@ -4703,7 +4703,7 @@
           <p:nvPr>
             <p:extLst>
               <p:ext uri="{D42A27DB-BD31-4B8C-83A1-F6EECF244321}">
-                <p14:modId xmlns:p14="http://schemas.microsoft.com/office/powerpoint/2010/main" val="3313431668"/>
+                <p14:modId xmlns:p14="http://schemas.microsoft.com/office/powerpoint/2010/main" val="952826975"/>
               </p:ext>
             </p:extLst>
           </p:nvPr>
@@ -4939,7 +4939,7 @@
           <p:nvPr>
             <p:extLst>
               <p:ext uri="{D42A27DB-BD31-4B8C-83A1-F6EECF244321}">
-                <p14:modId xmlns:p14="http://schemas.microsoft.com/office/powerpoint/2010/main" val="2683508801"/>
+                <p14:modId xmlns:p14="http://schemas.microsoft.com/office/powerpoint/2010/main" val="1563884449"/>
               </p:ext>
             </p:extLst>
           </p:nvPr>
@@ -5175,7 +5175,7 @@
           <p:nvPr>
             <p:extLst>
               <p:ext uri="{D42A27DB-BD31-4B8C-83A1-F6EECF244321}">
-                <p14:modId xmlns:p14="http://schemas.microsoft.com/office/powerpoint/2010/main" val="1536558122"/>
+                <p14:modId xmlns:p14="http://schemas.microsoft.com/office/powerpoint/2010/main" val="4007397948"/>
               </p:ext>
             </p:extLst>
           </p:nvPr>
@@ -5413,7 +5413,7 @@
           <p:nvPr>
             <p:extLst>
               <p:ext uri="{D42A27DB-BD31-4B8C-83A1-F6EECF244321}">
-                <p14:modId xmlns:p14="http://schemas.microsoft.com/office/powerpoint/2010/main" val="2320294248"/>
+                <p14:modId xmlns:p14="http://schemas.microsoft.com/office/powerpoint/2010/main" val="1613265414"/>
               </p:ext>
             </p:extLst>
           </p:nvPr>
@@ -5654,8 +5654,8 @@
             </p:nvSpPr>
             <p:spPr>
               <a:xfrm>
-                <a:off x="3561367" y="2009635"/>
-                <a:ext cx="345286" cy="276999"/>
+                <a:off x="3919805" y="2491006"/>
+                <a:ext cx="411010" cy="276999"/>
               </a:xfrm>
               <a:prstGeom prst="rect">
                 <a:avLst/>
@@ -5695,7 +5695,7 @@
                             <a:rPr lang="en-US" sz="1200" b="0" i="1" smtClean="0">
                               <a:latin typeface="Cambria Math" panose="02040503050406030204" pitchFamily="18" charset="0"/>
                             </a:rPr>
-                            <m:t>1</m:t>
+                            <m:t>12</m:t>
                           </m:r>
                         </m:sub>
                       </m:sSub>
@@ -5724,8 +5724,8 @@
             </p:nvSpPr>
             <p:spPr>
               <a:xfrm>
-                <a:off x="3561367" y="2009635"/>
-                <a:ext cx="345286" cy="276999"/>
+                <a:off x="3919805" y="2491006"/>
+                <a:ext cx="411010" cy="276999"/>
               </a:xfrm>
               <a:prstGeom prst="rect">
                 <a:avLst/>
@@ -5756,10 +5756,10 @@
         <mc:Choice xmlns:a14="http://schemas.microsoft.com/office/drawing/2010/main" Requires="a14">
           <p:sp>
             <p:nvSpPr>
-              <p:cNvPr id="68" name="TextBox 67">
+              <p:cNvPr id="69" name="TextBox 68">
                 <a:extLst>
                   <a:ext uri="{FF2B5EF4-FFF2-40B4-BE49-F238E27FC236}">
-                    <a16:creationId xmlns:a16="http://schemas.microsoft.com/office/drawing/2014/main" id="{10DE5257-C4B9-74F5-FACE-FE3C3F43DFEE}"/>
+                    <a16:creationId xmlns:a16="http://schemas.microsoft.com/office/drawing/2014/main" id="{3EA08BBF-0B73-7565-93B1-67887EDC3554}"/>
                   </a:ext>
                 </a:extLst>
               </p:cNvPr>
@@ -5768,8 +5768,8 @@
             </p:nvSpPr>
             <p:spPr>
               <a:xfrm>
-                <a:off x="4265092" y="2765582"/>
-                <a:ext cx="348878" cy="276999"/>
+                <a:off x="3251244" y="1629231"/>
+                <a:ext cx="414601" cy="276999"/>
               </a:xfrm>
               <a:prstGeom prst="rect">
                 <a:avLst/>
@@ -5809,7 +5809,7 @@
                             <a:rPr lang="en-US" sz="1200" b="0" i="1" smtClean="0">
                               <a:latin typeface="Cambria Math" panose="02040503050406030204" pitchFamily="18" charset="0"/>
                             </a:rPr>
-                            <m:t>2</m:t>
+                            <m:t>01</m:t>
                           </m:r>
                         </m:sub>
                       </m:sSub>
@@ -5824,10 +5824,10 @@
         <mc:Fallback>
           <p:sp>
             <p:nvSpPr>
-              <p:cNvPr id="68" name="TextBox 67">
+              <p:cNvPr id="69" name="TextBox 68">
                 <a:extLst>
                   <a:ext uri="{FF2B5EF4-FFF2-40B4-BE49-F238E27FC236}">
-                    <a16:creationId xmlns:a16="http://schemas.microsoft.com/office/drawing/2014/main" id="{10DE5257-C4B9-74F5-FACE-FE3C3F43DFEE}"/>
+                    <a16:creationId xmlns:a16="http://schemas.microsoft.com/office/drawing/2014/main" id="{3EA08BBF-0B73-7565-93B1-67887EDC3554}"/>
                   </a:ext>
                 </a:extLst>
               </p:cNvPr>
@@ -5838,8 +5838,8 @@
             </p:nvSpPr>
             <p:spPr>
               <a:xfrm>
-                <a:off x="4265092" y="2765582"/>
-                <a:ext cx="348878" cy="276999"/>
+                <a:off x="3251244" y="1629231"/>
+                <a:ext cx="414601" cy="276999"/>
               </a:xfrm>
               <a:prstGeom prst="rect">
                 <a:avLst/>
@@ -5866,14 +5866,203 @@
           </p:sp>
         </mc:Fallback>
       </mc:AlternateContent>
+      <p:sp>
+        <p:nvSpPr>
+          <p:cNvPr id="72" name="TextBox 71">
+            <a:extLst>
+              <a:ext uri="{FF2B5EF4-FFF2-40B4-BE49-F238E27FC236}">
+                <a16:creationId xmlns:a16="http://schemas.microsoft.com/office/drawing/2014/main" id="{82E719F9-56CD-B4D8-5EF6-45D528B8A69B}"/>
+              </a:ext>
+            </a:extLst>
+          </p:cNvPr>
+          <p:cNvSpPr txBox="1"/>
+          <p:nvPr/>
+        </p:nvSpPr>
+        <p:spPr>
+          <a:xfrm>
+            <a:off x="5477144" y="959423"/>
+            <a:ext cx="3706045" cy="1169551"/>
+          </a:xfrm>
+          <a:prstGeom prst="rect">
+            <a:avLst/>
+          </a:prstGeom>
+          <a:noFill/>
+          <a:ln>
+            <a:solidFill>
+              <a:schemeClr val="accent1">
+                <a:shade val="50000"/>
+              </a:schemeClr>
+            </a:solidFill>
+          </a:ln>
+        </p:spPr>
+        <p:txBody>
+          <a:bodyPr wrap="square" rtlCol="0">
+            <a:spAutoFit/>
+          </a:bodyPr>
+          <a:lstStyle/>
+          <a:p>
+            <a:r>
+              <a:rPr lang="en-US" sz="800" dirty="0" err="1">
+                <a:latin typeface="Monaco" pitchFamily="2" charset="77"/>
+              </a:rPr>
+              <a:t>observation_space</a:t>
+            </a:r>
+            <a:r>
+              <a:rPr lang="en-US" sz="800" dirty="0">
+                <a:latin typeface="Monaco" pitchFamily="2" charset="77"/>
+              </a:rPr>
+              <a:t>:</a:t>
+            </a:r>
+            <a:r>
+              <a:rPr lang="en-US" sz="1000" dirty="0"/>
+              <a:t> the gym space that describes vertex data</a:t>
+            </a:r>
+          </a:p>
+          <a:p>
+            <a:r>
+              <a:rPr lang="en-US" sz="800" dirty="0">
+                <a:latin typeface="Monaco" pitchFamily="2" charset="77"/>
+              </a:rPr>
+              <a:t>root</a:t>
+            </a:r>
+            <a:r>
+              <a:rPr lang="en-US" sz="1000" dirty="0">
+                <a:latin typeface="Monaco" pitchFamily="2" charset="77"/>
+              </a:rPr>
+              <a:t>:</a:t>
+            </a:r>
+            <a:r>
+              <a:rPr lang="en-US" sz="1000" dirty="0"/>
+              <a:t> root vertex instance</a:t>
+            </a:r>
+          </a:p>
+          <a:p>
+            <a:r>
+              <a:rPr lang="en-US" sz="800" dirty="0">
+                <a:latin typeface="Monaco" pitchFamily="2" charset="77"/>
+              </a:rPr>
+              <a:t>new</a:t>
+            </a:r>
+            <a:r>
+              <a:rPr lang="en-US" sz="1000" dirty="0">
+                <a:latin typeface="Monaco" pitchFamily="2" charset="77"/>
+              </a:rPr>
+              <a:t>:</a:t>
+            </a:r>
+            <a:r>
+              <a:rPr lang="en-US" sz="1000" dirty="0"/>
+              <a:t> new vertex instance</a:t>
+            </a:r>
+          </a:p>
+          <a:p>
+            <a:r>
+              <a:rPr lang="en-US" sz="800" dirty="0">
+                <a:latin typeface="Monaco" pitchFamily="2" charset="77"/>
+              </a:rPr>
+              <a:t>reward</a:t>
+            </a:r>
+            <a:r>
+              <a:rPr lang="en-US" sz="1000" dirty="0">
+                <a:latin typeface="Monaco" pitchFamily="2" charset="77"/>
+              </a:rPr>
+              <a:t>:</a:t>
+            </a:r>
+            <a:r>
+              <a:rPr lang="en-US" sz="1000" dirty="0"/>
+              <a:t>  vertex reward</a:t>
+            </a:r>
+          </a:p>
+          <a:p>
+            <a:r>
+              <a:rPr lang="en-US" sz="800" dirty="0">
+                <a:latin typeface="Monaco" pitchFamily="2" charset="77"/>
+              </a:rPr>
+              <a:t>info</a:t>
+            </a:r>
+            <a:r>
+              <a:rPr lang="en-US" sz="1000" dirty="0">
+                <a:latin typeface="Monaco" pitchFamily="2" charset="77"/>
+              </a:rPr>
+              <a:t>:</a:t>
+            </a:r>
+            <a:r>
+              <a:rPr lang="en-US" sz="1000" dirty="0"/>
+              <a:t> metadata</a:t>
+            </a:r>
+          </a:p>
+          <a:p>
+            <a:r>
+              <a:rPr lang="en-US" sz="800" dirty="0">
+                <a:latin typeface="Monaco" pitchFamily="2" charset="77"/>
+              </a:rPr>
+              <a:t>_</a:t>
+            </a:r>
+            <a:r>
+              <a:rPr lang="en-US" sz="800" dirty="0" err="1">
+                <a:latin typeface="Monaco" pitchFamily="2" charset="77"/>
+              </a:rPr>
+              <a:t>get_children</a:t>
+            </a:r>
+            <a:r>
+              <a:rPr lang="en-US" sz="800" dirty="0">
+                <a:latin typeface="Monaco" pitchFamily="2" charset="77"/>
+              </a:rPr>
+              <a:t>:</a:t>
+            </a:r>
+            <a:r>
+              <a:rPr lang="en-US" sz="1000" dirty="0">
+                <a:sym typeface="Wingdings" pitchFamily="2" charset="2"/>
+              </a:rPr>
+              <a:t> </a:t>
+            </a:r>
+            <a:r>
+              <a:rPr lang="en-US" sz="1000" dirty="0" err="1">
+                <a:sym typeface="Wingdings" pitchFamily="2" charset="2"/>
+              </a:rPr>
+              <a:t>iterable</a:t>
+            </a:r>
+            <a:r>
+              <a:rPr lang="en-US" sz="1000" dirty="0">
+                <a:sym typeface="Wingdings" pitchFamily="2" charset="2"/>
+              </a:rPr>
+              <a:t> of accessible vertices</a:t>
+            </a:r>
+            <a:endParaRPr lang="en-US" sz="1000" dirty="0"/>
+          </a:p>
+          <a:p>
+            <a:r>
+              <a:rPr lang="en-US" sz="800" dirty="0">
+                <a:latin typeface="Monaco" pitchFamily="2" charset="77"/>
+              </a:rPr>
+              <a:t>_</a:t>
+            </a:r>
+            <a:r>
+              <a:rPr lang="en-US" sz="800" dirty="0" err="1">
+                <a:latin typeface="Monaco" pitchFamily="2" charset="77"/>
+              </a:rPr>
+              <a:t>make_observation</a:t>
+            </a:r>
+            <a:r>
+              <a:rPr lang="en-US" sz="800" dirty="0">
+                <a:latin typeface="Monaco" pitchFamily="2" charset="77"/>
+              </a:rPr>
+              <a:t>:</a:t>
+            </a:r>
+            <a:r>
+              <a:rPr lang="en-US" sz="1000" dirty="0"/>
+              <a:t> vertex observation data</a:t>
+            </a:r>
+          </a:p>
+        </p:txBody>
+      </p:sp>
       <mc:AlternateContent xmlns:mc="http://schemas.openxmlformats.org/markup-compatibility/2006">
         <mc:Choice xmlns:a14="http://schemas.microsoft.com/office/drawing/2010/main" Requires="a14">
           <p:sp>
             <p:nvSpPr>
-              <p:cNvPr id="69" name="TextBox 68">
+              <p:cNvPr id="83" name="TextBox 82">
                 <a:extLst>
                   <a:ext uri="{FF2B5EF4-FFF2-40B4-BE49-F238E27FC236}">
-                    <a16:creationId xmlns:a16="http://schemas.microsoft.com/office/drawing/2014/main" id="{3EA08BBF-0B73-7565-93B1-67887EDC3554}"/>
+                    <a16:creationId xmlns:a16="http://schemas.microsoft.com/office/drawing/2014/main" id="{45900C5B-9B4B-9B3F-58A8-4D9FF7F8A62B}"/>
                   </a:ext>
                 </a:extLst>
               </p:cNvPr>
@@ -5882,8 +6071,8 @@
             </p:nvSpPr>
             <p:spPr>
               <a:xfrm>
-                <a:off x="2983951" y="1263772"/>
-                <a:ext cx="348878" cy="276999"/>
+                <a:off x="2913888" y="2560946"/>
+                <a:ext cx="411010" cy="276999"/>
               </a:xfrm>
               <a:prstGeom prst="rect">
                 <a:avLst/>
@@ -5923,7 +6112,7 @@
                             <a:rPr lang="en-US" sz="1200" b="0" i="1" smtClean="0">
                               <a:latin typeface="Cambria Math" panose="02040503050406030204" pitchFamily="18" charset="0"/>
                             </a:rPr>
-                            <m:t>0</m:t>
+                            <m:t>10</m:t>
                           </m:r>
                         </m:sub>
                       </m:sSub>
@@ -5938,10 +6127,10 @@
         <mc:Fallback>
           <p:sp>
             <p:nvSpPr>
-              <p:cNvPr id="69" name="TextBox 68">
+              <p:cNvPr id="83" name="TextBox 82">
                 <a:extLst>
                   <a:ext uri="{FF2B5EF4-FFF2-40B4-BE49-F238E27FC236}">
-                    <a16:creationId xmlns:a16="http://schemas.microsoft.com/office/drawing/2014/main" id="{3EA08BBF-0B73-7565-93B1-67887EDC3554}"/>
+                    <a16:creationId xmlns:a16="http://schemas.microsoft.com/office/drawing/2014/main" id="{45900C5B-9B4B-9B3F-58A8-4D9FF7F8A62B}"/>
                   </a:ext>
                 </a:extLst>
               </p:cNvPr>
@@ -5952,8 +6141,8 @@
             </p:nvSpPr>
             <p:spPr>
               <a:xfrm>
-                <a:off x="2983951" y="1263772"/>
-                <a:ext cx="348878" cy="276999"/>
+                <a:off x="2913888" y="2560946"/>
+                <a:ext cx="411010" cy="276999"/>
               </a:xfrm>
               <a:prstGeom prst="rect">
                 <a:avLst/>
@@ -5980,232 +6169,6 @@
           </p:sp>
         </mc:Fallback>
       </mc:AlternateContent>
-      <p:sp>
-        <p:nvSpPr>
-          <p:cNvPr id="72" name="TextBox 71">
-            <a:extLst>
-              <a:ext uri="{FF2B5EF4-FFF2-40B4-BE49-F238E27FC236}">
-                <a16:creationId xmlns:a16="http://schemas.microsoft.com/office/drawing/2014/main" id="{82E719F9-56CD-B4D8-5EF6-45D528B8A69B}"/>
-              </a:ext>
-            </a:extLst>
-          </p:cNvPr>
-          <p:cNvSpPr txBox="1"/>
-          <p:nvPr/>
-        </p:nvSpPr>
-        <p:spPr>
-          <a:xfrm>
-            <a:off x="4905060" y="1444907"/>
-            <a:ext cx="3706045" cy="1169551"/>
-          </a:xfrm>
-          <a:prstGeom prst="rect">
-            <a:avLst/>
-          </a:prstGeom>
-          <a:noFill/>
-          <a:ln>
-            <a:solidFill>
-              <a:schemeClr val="accent1">
-                <a:shade val="50000"/>
-              </a:schemeClr>
-            </a:solidFill>
-          </a:ln>
-        </p:spPr>
-        <p:txBody>
-          <a:bodyPr wrap="square" rtlCol="0">
-            <a:spAutoFit/>
-          </a:bodyPr>
-          <a:lstStyle/>
-          <a:p>
-            <a:r>
-              <a:rPr lang="en-US" sz="800" dirty="0" err="1">
-                <a:latin typeface="Monaco" pitchFamily="2" charset="77"/>
-              </a:rPr>
-              <a:t>observation_space</a:t>
-            </a:r>
-            <a:r>
-              <a:rPr lang="en-US" sz="800" dirty="0">
-                <a:latin typeface="Monaco" pitchFamily="2" charset="77"/>
-              </a:rPr>
-              <a:t>:</a:t>
-            </a:r>
-            <a:r>
-              <a:rPr lang="en-US" sz="1000" dirty="0"/>
-              <a:t> the gym space that describes vertex data</a:t>
-            </a:r>
-          </a:p>
-          <a:p>
-            <a:r>
-              <a:rPr lang="en-US" sz="800" dirty="0">
-                <a:latin typeface="Monaco" pitchFamily="2" charset="77"/>
-              </a:rPr>
-              <a:t>root</a:t>
-            </a:r>
-            <a:r>
-              <a:rPr lang="en-US" sz="1000" dirty="0">
-                <a:latin typeface="Monaco" pitchFamily="2" charset="77"/>
-              </a:rPr>
-              <a:t>:</a:t>
-            </a:r>
-            <a:r>
-              <a:rPr lang="en-US" sz="1000" dirty="0"/>
-              <a:t> root vertex instance</a:t>
-            </a:r>
-          </a:p>
-          <a:p>
-            <a:r>
-              <a:rPr lang="en-US" sz="800" dirty="0">
-                <a:latin typeface="Monaco" pitchFamily="2" charset="77"/>
-              </a:rPr>
-              <a:t>new</a:t>
-            </a:r>
-            <a:r>
-              <a:rPr lang="en-US" sz="1000" dirty="0">
-                <a:latin typeface="Monaco" pitchFamily="2" charset="77"/>
-              </a:rPr>
-              <a:t>:</a:t>
-            </a:r>
-            <a:r>
-              <a:rPr lang="en-US" sz="1000" dirty="0"/>
-              <a:t> new vertex instance</a:t>
-            </a:r>
-          </a:p>
-          <a:p>
-            <a:r>
-              <a:rPr lang="en-US" sz="800" dirty="0">
-                <a:latin typeface="Monaco" pitchFamily="2" charset="77"/>
-              </a:rPr>
-              <a:t>reward</a:t>
-            </a:r>
-            <a:r>
-              <a:rPr lang="en-US" sz="1000" dirty="0">
-                <a:latin typeface="Monaco" pitchFamily="2" charset="77"/>
-              </a:rPr>
-              <a:t>:</a:t>
-            </a:r>
-            <a:r>
-              <a:rPr lang="en-US" sz="1000" dirty="0"/>
-              <a:t>  vertex reward</a:t>
-            </a:r>
-          </a:p>
-          <a:p>
-            <a:r>
-              <a:rPr lang="en-US" sz="800" dirty="0">
-                <a:latin typeface="Monaco" pitchFamily="2" charset="77"/>
-              </a:rPr>
-              <a:t>info</a:t>
-            </a:r>
-            <a:r>
-              <a:rPr lang="en-US" sz="1000" dirty="0">
-                <a:latin typeface="Monaco" pitchFamily="2" charset="77"/>
-              </a:rPr>
-              <a:t>:</a:t>
-            </a:r>
-            <a:r>
-              <a:rPr lang="en-US" sz="1000" dirty="0"/>
-              <a:t> metadata</a:t>
-            </a:r>
-          </a:p>
-          <a:p>
-            <a:r>
-              <a:rPr lang="en-US" sz="800" dirty="0">
-                <a:latin typeface="Monaco" pitchFamily="2" charset="77"/>
-              </a:rPr>
-              <a:t>_</a:t>
-            </a:r>
-            <a:r>
-              <a:rPr lang="en-US" sz="800" dirty="0" err="1">
-                <a:latin typeface="Monaco" pitchFamily="2" charset="77"/>
-              </a:rPr>
-              <a:t>get_children</a:t>
-            </a:r>
-            <a:r>
-              <a:rPr lang="en-US" sz="800" dirty="0">
-                <a:latin typeface="Monaco" pitchFamily="2" charset="77"/>
-              </a:rPr>
-              <a:t>:</a:t>
-            </a:r>
-            <a:r>
-              <a:rPr lang="en-US" sz="1000" dirty="0">
-                <a:sym typeface="Wingdings" pitchFamily="2" charset="2"/>
-              </a:rPr>
-              <a:t> </a:t>
-            </a:r>
-            <a:r>
-              <a:rPr lang="en-US" sz="1000" dirty="0" err="1">
-                <a:sym typeface="Wingdings" pitchFamily="2" charset="2"/>
-              </a:rPr>
-              <a:t>iterable</a:t>
-            </a:r>
-            <a:r>
-              <a:rPr lang="en-US" sz="1000" dirty="0">
-                <a:sym typeface="Wingdings" pitchFamily="2" charset="2"/>
-              </a:rPr>
-              <a:t> of accessible vertices</a:t>
-            </a:r>
-            <a:endParaRPr lang="en-US" sz="1000" dirty="0"/>
-          </a:p>
-          <a:p>
-            <a:r>
-              <a:rPr lang="en-US" sz="800" dirty="0">
-                <a:latin typeface="Monaco" pitchFamily="2" charset="77"/>
-              </a:rPr>
-              <a:t>_</a:t>
-            </a:r>
-            <a:r>
-              <a:rPr lang="en-US" sz="800" dirty="0" err="1">
-                <a:latin typeface="Monaco" pitchFamily="2" charset="77"/>
-              </a:rPr>
-              <a:t>make_observation</a:t>
-            </a:r>
-            <a:r>
-              <a:rPr lang="en-US" sz="800" dirty="0">
-                <a:latin typeface="Monaco" pitchFamily="2" charset="77"/>
-              </a:rPr>
-              <a:t>:</a:t>
-            </a:r>
-            <a:r>
-              <a:rPr lang="en-US" sz="1000" dirty="0"/>
-              <a:t> vertex observation data</a:t>
-            </a:r>
-          </a:p>
-        </p:txBody>
-      </p:sp>
-      <p:sp>
-        <p:nvSpPr>
-          <p:cNvPr id="82" name="TextBox 81">
-            <a:extLst>
-              <a:ext uri="{FF2B5EF4-FFF2-40B4-BE49-F238E27FC236}">
-                <a16:creationId xmlns:a16="http://schemas.microsoft.com/office/drawing/2014/main" id="{7D18897E-7919-66FD-9900-66D5C5B23DDA}"/>
-              </a:ext>
-            </a:extLst>
-          </p:cNvPr>
-          <p:cNvSpPr txBox="1"/>
-          <p:nvPr/>
-        </p:nvSpPr>
-        <p:spPr>
-          <a:xfrm>
-            <a:off x="3752234" y="2210691"/>
-            <a:ext cx="694421" cy="261610"/>
-          </a:xfrm>
-          <a:prstGeom prst="rect">
-            <a:avLst/>
-          </a:prstGeom>
-          <a:noFill/>
-        </p:spPr>
-        <p:txBody>
-          <a:bodyPr wrap="none" rtlCol="0">
-            <a:spAutoFit/>
-          </a:bodyPr>
-          <a:lstStyle/>
-          <a:p>
-            <a:r>
-              <a:rPr lang="en-US" sz="1100" dirty="0">
-                <a:latin typeface="Monaco" pitchFamily="2" charset="77"/>
-              </a:rPr>
-              <a:t>Vertex</a:t>
-            </a:r>
-          </a:p>
-        </p:txBody>
-      </p:sp>
     </p:spTree>
     <p:extLst>
       <p:ext uri="{BB962C8B-B14F-4D97-AF65-F5344CB8AC3E}">
@@ -6252,8 +6215,8 @@
         </p:nvCxnSpPr>
         <p:spPr>
           <a:xfrm flipH="1">
-            <a:off x="2925119" y="983417"/>
-            <a:ext cx="350763" cy="784720"/>
+            <a:off x="2918515" y="983417"/>
+            <a:ext cx="357367" cy="783510"/>
           </a:xfrm>
           <a:prstGeom prst="straightConnector1">
             <a:avLst/>
@@ -6580,7 +6543,7 @@
             </p:nvSpPr>
             <p:spPr>
               <a:xfrm>
-                <a:off x="2396717" y="1633349"/>
+                <a:off x="2327434" y="1625477"/>
                 <a:ext cx="528799" cy="261610"/>
               </a:xfrm>
               <a:prstGeom prst="rect">
@@ -6637,7 +6600,7 @@
             </p:nvSpPr>
             <p:spPr>
               <a:xfrm>
-                <a:off x="2396717" y="1633349"/>
+                <a:off x="2327434" y="1625477"/>
                 <a:ext cx="528799" cy="261610"/>
               </a:xfrm>
               <a:prstGeom prst="rect">
@@ -6681,7 +6644,7 @@
             </p:nvSpPr>
             <p:spPr>
               <a:xfrm>
-                <a:off x="3626644" y="1636072"/>
+                <a:off x="3656845" y="1637332"/>
                 <a:ext cx="528799" cy="261610"/>
               </a:xfrm>
               <a:prstGeom prst="rect">
@@ -6738,7 +6701,7 @@
             </p:nvSpPr>
             <p:spPr>
               <a:xfrm>
-                <a:off x="3626644" y="1636072"/>
+                <a:off x="3656845" y="1637332"/>
                 <a:ext cx="528799" cy="261610"/>
               </a:xfrm>
               <a:prstGeom prst="rect">
@@ -6865,14 +6828,13 @@
           </p:cNvPr>
           <p:cNvCxnSpPr>
             <a:cxnSpLocks/>
-            <a:stCxn id="31" idx="3"/>
           </p:cNvCxnSpPr>
           <p:nvPr/>
         </p:nvCxnSpPr>
         <p:spPr>
           <a:xfrm>
-            <a:off x="2925516" y="1764154"/>
-            <a:ext cx="0" cy="679340"/>
+            <a:off x="2918515" y="1766927"/>
+            <a:ext cx="0" cy="655977"/>
           </a:xfrm>
           <a:prstGeom prst="straightConnector1">
             <a:avLst/>

</xml_diff>